<commit_message>
cleanup and small changes to KNN presentation
</commit_message>
<xml_diff>
--- a/excercises/K-nearestNeighbor/ML-KNN.pptx
+++ b/excercises/K-nearestNeighbor/ML-KNN.pptx
@@ -124,6 +124,45 @@
 
 <file path=ppt/changesInfos/changesInfo1.xml><?xml version="1.0" encoding="utf-8"?>
 <pc:chgInfo xmlns:a="http://schemas.openxmlformats.org/drawingml/2006/main" xmlns:r="http://schemas.openxmlformats.org/officeDocument/2006/relationships" xmlns:ac="http://schemas.microsoft.com/office/drawing/2013/main/command" xmlns:pc="http://schemas.microsoft.com/office/powerpoint/2013/main/command">
+  <pc:docChgLst>
+    <pc:chgData name="Velzen, M.A.J. van (Marcel)" userId="76c443b0-08c6-47fe-983d-b2a21ea027dc" providerId="ADAL" clId="{35ED13C2-A8A2-4F7E-B6C7-2F4757D30EC3}"/>
+    <pc:docChg chg="modSld">
+      <pc:chgData name="Velzen, M.A.J. van (Marcel)" userId="76c443b0-08c6-47fe-983d-b2a21ea027dc" providerId="ADAL" clId="{35ED13C2-A8A2-4F7E-B6C7-2F4757D30EC3}" dt="2023-07-06T20:07:22.594" v="12" actId="20577"/>
+      <pc:docMkLst>
+        <pc:docMk/>
+      </pc:docMkLst>
+      <pc:sldChg chg="modSp mod">
+        <pc:chgData name="Velzen, M.A.J. van (Marcel)" userId="76c443b0-08c6-47fe-983d-b2a21ea027dc" providerId="ADAL" clId="{35ED13C2-A8A2-4F7E-B6C7-2F4757D30EC3}" dt="2023-07-06T20:07:07.039" v="9" actId="20577"/>
+        <pc:sldMkLst>
+          <pc:docMk/>
+          <pc:sldMk cId="3341964540" sldId="274"/>
+        </pc:sldMkLst>
+        <pc:spChg chg="mod">
+          <ac:chgData name="Velzen, M.A.J. van (Marcel)" userId="76c443b0-08c6-47fe-983d-b2a21ea027dc" providerId="ADAL" clId="{35ED13C2-A8A2-4F7E-B6C7-2F4757D30EC3}" dt="2023-07-06T20:07:07.039" v="9" actId="20577"/>
+          <ac:spMkLst>
+            <pc:docMk/>
+            <pc:sldMk cId="3341964540" sldId="274"/>
+            <ac:spMk id="6" creationId="{5C8D2299-E5E5-E3B9-BFFF-3DB94888F846}"/>
+          </ac:spMkLst>
+        </pc:spChg>
+      </pc:sldChg>
+      <pc:sldChg chg="modSp mod">
+        <pc:chgData name="Velzen, M.A.J. van (Marcel)" userId="76c443b0-08c6-47fe-983d-b2a21ea027dc" providerId="ADAL" clId="{35ED13C2-A8A2-4F7E-B6C7-2F4757D30EC3}" dt="2023-07-06T20:07:22.594" v="12" actId="20577"/>
+        <pc:sldMkLst>
+          <pc:docMk/>
+          <pc:sldMk cId="749685030" sldId="278"/>
+        </pc:sldMkLst>
+        <pc:spChg chg="mod">
+          <ac:chgData name="Velzen, M.A.J. van (Marcel)" userId="76c443b0-08c6-47fe-983d-b2a21ea027dc" providerId="ADAL" clId="{35ED13C2-A8A2-4F7E-B6C7-2F4757D30EC3}" dt="2023-07-06T20:07:22.594" v="12" actId="20577"/>
+          <ac:spMkLst>
+            <pc:docMk/>
+            <pc:sldMk cId="749685030" sldId="278"/>
+            <ac:spMk id="6" creationId="{5C8D2299-E5E5-E3B9-BFFF-3DB94888F846}"/>
+          </ac:spMkLst>
+        </pc:spChg>
+      </pc:sldChg>
+    </pc:docChg>
+  </pc:docChgLst>
   <pc:docChgLst>
     <pc:chgData name="Velzen, M.A.J. van (Marcel)" userId="76c443b0-08c6-47fe-983d-b2a21ea027dc" providerId="ADAL" clId="{B2B8E0D6-7F8E-4AB5-ADB4-0D6BA29F80E5}"/>
     <pc:docChg chg="undo custSel modSld">
@@ -6078,7 +6117,21 @@
                 <a:effectLst/>
                 <a:latin typeface="Helvetica Neue" panose="02000503000000020004" pitchFamily="2" charset="0"/>
               </a:rPr>
-              <a:t> set </a:t>
+              <a:t> start </a:t>
+            </a:r>
+            <a:r>
+              <a:rPr lang="nl-NL" sz="1200" b="0" i="0" dirty="0" err="1">
+                <a:effectLst/>
+                <a:latin typeface="Helvetica Neue" panose="02000503000000020004" pitchFamily="2" charset="0"/>
+              </a:rPr>
+              <a:t>with</a:t>
+            </a:r>
+            <a:r>
+              <a:rPr lang="nl-NL" sz="1200" b="0" i="0" dirty="0">
+                <a:effectLst/>
+                <a:latin typeface="Helvetica Neue" panose="02000503000000020004" pitchFamily="2" charset="0"/>
+              </a:rPr>
+              <a:t> </a:t>
             </a:r>
             <a:r>
               <a:rPr lang="nl-NL" sz="1200" b="0" i="1" dirty="0">
@@ -8565,7 +8618,7 @@
         <p:spPr>
           <a:xfrm>
             <a:off x="495889" y="1196785"/>
-            <a:ext cx="7866876" cy="4522861"/>
+            <a:ext cx="7866876" cy="3968864"/>
           </a:xfrm>
           <a:prstGeom prst="rect">
             <a:avLst/>
@@ -8815,43 +8868,16 @@
                 <a:effectLst/>
                 <a:latin typeface="Helvetica Neue" panose="02000503000000020004" pitchFamily="2" charset="0"/>
               </a:rPr>
-              <a:t> KNN can predict equipment failures or maintenance needs by analyzing historical patterns and similarities with current operating conditions, reducing downtime and optimizing maintenance schedules.</a:t>
-            </a:r>
-          </a:p>
-          <a:p>
-            <a:pPr>
-              <a:lnSpc>
-                <a:spcPct val="100000"/>
-              </a:lnSpc>
-              <a:buNone/>
-            </a:pPr>
+              <a:t> KNN can predict equipment failures or maintenance needs by analyzing historical patterns and similarities with current operating conditions, reducing downtime and optimizing maintenance </a:t>
+            </a:r>
+            <a:r>
+              <a:rPr lang="en-US" sz="1200" b="0" i="0">
+                <a:effectLst/>
+                <a:latin typeface="Helvetica Neue" panose="02000503000000020004" pitchFamily="2" charset="0"/>
+              </a:rPr>
+              <a:t>schedules.</a:t>
+            </a:r>
             <a:endParaRPr lang="en-US" sz="1200" b="0" i="0" dirty="0">
-              <a:effectLst/>
-              <a:latin typeface="Helvetica Neue" panose="02000503000000020004" pitchFamily="2" charset="0"/>
-            </a:endParaRPr>
-          </a:p>
-          <a:p>
-            <a:pPr>
-              <a:lnSpc>
-                <a:spcPct val="100000"/>
-              </a:lnSpc>
-              <a:buNone/>
-            </a:pPr>
-            <a:r>
-              <a:rPr lang="en-US" sz="1200" b="1" i="0" dirty="0">
-                <a:effectLst/>
-                <a:latin typeface="Helvetica Neue" panose="02000503000000020004" pitchFamily="2" charset="0"/>
-              </a:rPr>
-              <a:t>Market Basket Analysis:</a:t>
-            </a:r>
-            <a:r>
-              <a:rPr lang="en-US" sz="1200" b="0" i="0" dirty="0">
-                <a:effectLst/>
-                <a:latin typeface="Helvetica Neue" panose="02000503000000020004" pitchFamily="2" charset="0"/>
-              </a:rPr>
-              <a:t> KNN can analyze customer purchase patterns to identify frequently co-occurring items, enabling businesses to optimize product placements, cross-selling, and targeted promotions.</a:t>
-            </a:r>
-            <a:endParaRPr lang="nl-NL" sz="1200" b="0" i="0" dirty="0">
               <a:effectLst/>
               <a:latin typeface="Helvetica Neue" panose="02000503000000020004" pitchFamily="2" charset="0"/>
             </a:endParaRPr>
@@ -9737,6 +9763,15 @@
 </file>
 
 <file path=customXml/item1.xml><?xml version="1.0" encoding="utf-8"?>
+<?mso-contentType ?>
+<FormTemplates xmlns="http://schemas.microsoft.com/sharepoint/v3/contenttype/forms">
+  <Display>DocumentLibraryForm</Display>
+  <Edit>DocumentLibraryForm</Edit>
+  <New>DocumentLibraryForm</New>
+</FormTemplates>
+</file>
+
+<file path=customXml/item2.xml><?xml version="1.0" encoding="utf-8"?>
 <p:properties xmlns:p="http://schemas.microsoft.com/office/2006/metadata/properties" xmlns:xsi="http://www.w3.org/2001/XMLSchema-instance" xmlns:pc="http://schemas.microsoft.com/office/infopath/2007/PartnerControls">
   <documentManagement>
     <Snelkoppeling_links xmlns="11c69230-f4e8-4222-9897-a22de6b9760d">
@@ -9753,15 +9788,6 @@
     <Document_x0020_Datum xmlns="11c69230-f4e8-4222-9897-a22de6b9760d" xsi:nil="true"/>
   </documentManagement>
 </p:properties>
-</file>
-
-<file path=customXml/item2.xml><?xml version="1.0" encoding="utf-8"?>
-<?mso-contentType ?>
-<FormTemplates xmlns="http://schemas.microsoft.com/sharepoint/v3/contenttype/forms">
-  <Display>DocumentLibraryForm</Display>
-  <Edit>DocumentLibraryForm</Edit>
-  <New>DocumentLibraryForm</New>
-</FormTemplates>
 </file>
 
 <file path=customXml/item3.xml><?xml version="1.0" encoding="utf-8"?>
@@ -9975,6 +10001,14 @@
 </file>
 
 <file path=customXml/itemProps1.xml><?xml version="1.0" encoding="utf-8"?>
+<ds:datastoreItem xmlns:ds="http://schemas.openxmlformats.org/officeDocument/2006/customXml" ds:itemID="{26D75D56-8046-438E-8E4B-44DA50BB2A2D}">
+  <ds:schemaRefs>
+    <ds:schemaRef ds:uri="http://schemas.microsoft.com/sharepoint/v3/contenttype/forms"/>
+  </ds:schemaRefs>
+</ds:datastoreItem>
+</file>
+
+<file path=customXml/itemProps2.xml><?xml version="1.0" encoding="utf-8"?>
 <ds:datastoreItem xmlns:ds="http://schemas.openxmlformats.org/officeDocument/2006/customXml" ds:itemID="{7B43447D-B8CC-4D86-8E6F-4041028C6E5C}">
   <ds:schemaRefs>
     <ds:schemaRef ds:uri="http://schemas.microsoft.com/office/2006/documentManagement/types"/>
@@ -9988,14 +10022,6 @@
     <ds:schemaRef ds:uri="http://schemas.openxmlformats.org/package/2006/metadata/core-properties"/>
     <ds:schemaRef ds:uri="11c69230-f4e8-4222-9897-a22de6b9760d"/>
     <ds:schemaRef ds:uri="http://purl.org/dc/elements/1.1/"/>
-  </ds:schemaRefs>
-</ds:datastoreItem>
-</file>
-
-<file path=customXml/itemProps2.xml><?xml version="1.0" encoding="utf-8"?>
-<ds:datastoreItem xmlns:ds="http://schemas.openxmlformats.org/officeDocument/2006/customXml" ds:itemID="{26D75D56-8046-438E-8E4B-44DA50BB2A2D}">
-  <ds:schemaRefs>
-    <ds:schemaRef ds:uri="http://schemas.microsoft.com/sharepoint/v3/contenttype/forms"/>
   </ds:schemaRefs>
 </ds:datastoreItem>
 </file>

</xml_diff>